<commit_message>
/ ‘radius/FreeRadius Exercise 2016.pdf’ / ‘radius/FreeRadius Exercise 2016.pptx’
</commit_message>
<xml_diff>
--- a/radius/FreeRadius Exercise 2016.pptx
+++ b/radius/FreeRadius Exercise 2016.pptx
@@ -262,7 +262,7 @@
           <a:p>
             <a:fld id="{107C2756-2BBE-4DC5-8619-26004F42F43A}" type="datetimeFigureOut">
               <a:rPr lang="en-US" smtClean="0"/>
-              <a:t>30-May-16</a:t>
+              <a:t>02-May-18</a:t>
             </a:fld>
             <a:endParaRPr lang="en-US"/>
           </a:p>
@@ -432,7 +432,7 @@
           <a:p>
             <a:fld id="{107C2756-2BBE-4DC5-8619-26004F42F43A}" type="datetimeFigureOut">
               <a:rPr lang="en-US" smtClean="0"/>
-              <a:t>30-May-16</a:t>
+              <a:t>02-May-18</a:t>
             </a:fld>
             <a:endParaRPr lang="en-US"/>
           </a:p>
@@ -612,7 +612,7 @@
           <a:p>
             <a:fld id="{107C2756-2BBE-4DC5-8619-26004F42F43A}" type="datetimeFigureOut">
               <a:rPr lang="en-US" smtClean="0"/>
-              <a:t>30-May-16</a:t>
+              <a:t>02-May-18</a:t>
             </a:fld>
             <a:endParaRPr lang="en-US"/>
           </a:p>
@@ -782,7 +782,7 @@
           <a:p>
             <a:fld id="{107C2756-2BBE-4DC5-8619-26004F42F43A}" type="datetimeFigureOut">
               <a:rPr lang="en-US" smtClean="0"/>
-              <a:t>30-May-16</a:t>
+              <a:t>02-May-18</a:t>
             </a:fld>
             <a:endParaRPr lang="en-US"/>
           </a:p>
@@ -1028,7 +1028,7 @@
           <a:p>
             <a:fld id="{107C2756-2BBE-4DC5-8619-26004F42F43A}" type="datetimeFigureOut">
               <a:rPr lang="en-US" smtClean="0"/>
-              <a:t>30-May-16</a:t>
+              <a:t>02-May-18</a:t>
             </a:fld>
             <a:endParaRPr lang="en-US"/>
           </a:p>
@@ -1260,7 +1260,7 @@
           <a:p>
             <a:fld id="{107C2756-2BBE-4DC5-8619-26004F42F43A}" type="datetimeFigureOut">
               <a:rPr lang="en-US" smtClean="0"/>
-              <a:t>30-May-16</a:t>
+              <a:t>02-May-18</a:t>
             </a:fld>
             <a:endParaRPr lang="en-US"/>
           </a:p>
@@ -1627,7 +1627,7 @@
           <a:p>
             <a:fld id="{107C2756-2BBE-4DC5-8619-26004F42F43A}" type="datetimeFigureOut">
               <a:rPr lang="en-US" smtClean="0"/>
-              <a:t>30-May-16</a:t>
+              <a:t>02-May-18</a:t>
             </a:fld>
             <a:endParaRPr lang="en-US"/>
           </a:p>
@@ -1745,7 +1745,7 @@
           <a:p>
             <a:fld id="{107C2756-2BBE-4DC5-8619-26004F42F43A}" type="datetimeFigureOut">
               <a:rPr lang="en-US" smtClean="0"/>
-              <a:t>30-May-16</a:t>
+              <a:t>02-May-18</a:t>
             </a:fld>
             <a:endParaRPr lang="en-US"/>
           </a:p>
@@ -1840,7 +1840,7 @@
           <a:p>
             <a:fld id="{107C2756-2BBE-4DC5-8619-26004F42F43A}" type="datetimeFigureOut">
               <a:rPr lang="en-US" smtClean="0"/>
-              <a:t>30-May-16</a:t>
+              <a:t>02-May-18</a:t>
             </a:fld>
             <a:endParaRPr lang="en-US"/>
           </a:p>
@@ -2117,7 +2117,7 @@
           <a:p>
             <a:fld id="{107C2756-2BBE-4DC5-8619-26004F42F43A}" type="datetimeFigureOut">
               <a:rPr lang="en-US" smtClean="0"/>
-              <a:t>30-May-16</a:t>
+              <a:t>02-May-18</a:t>
             </a:fld>
             <a:endParaRPr lang="en-US"/>
           </a:p>
@@ -2370,7 +2370,7 @@
           <a:p>
             <a:fld id="{107C2756-2BBE-4DC5-8619-26004F42F43A}" type="datetimeFigureOut">
               <a:rPr lang="en-US" smtClean="0"/>
-              <a:t>30-May-16</a:t>
+              <a:t>02-May-18</a:t>
             </a:fld>
             <a:endParaRPr lang="en-US"/>
           </a:p>
@@ -2583,7 +2583,7 @@
           <a:p>
             <a:fld id="{107C2756-2BBE-4DC5-8619-26004F42F43A}" type="datetimeFigureOut">
               <a:rPr lang="en-US" smtClean="0"/>
-              <a:t>30-May-16</a:t>
+              <a:t>02-May-18</a:t>
             </a:fld>
             <a:endParaRPr lang="en-US"/>
           </a:p>
@@ -3252,27 +3252,35 @@
           </a:p>
           <a:p>
             <a:r>
+              <a:rPr lang="en-US" dirty="0" err="1" smtClean="0"/>
+              <a:t>sudo</a:t>
+            </a:r>
+            <a:r>
               <a:rPr lang="en-US" dirty="0" smtClean="0"/>
+              <a:t> </a:t>
+            </a:r>
+            <a:r>
+              <a:rPr lang="en-US" dirty="0"/>
               <a:t>vi /</a:t>
             </a:r>
             <a:r>
-              <a:rPr lang="en-US" dirty="0" err="1" smtClean="0"/>
+              <a:rPr lang="en-US" dirty="0" err="1"/>
               <a:t>etc</a:t>
             </a:r>
             <a:r>
-              <a:rPr lang="en-US" dirty="0" smtClean="0"/>
+              <a:rPr lang="en-US" dirty="0"/>
               <a:t>/</a:t>
             </a:r>
             <a:r>
-              <a:rPr lang="en-US" dirty="0" err="1" smtClean="0"/>
+              <a:rPr lang="en-US" dirty="0" err="1"/>
               <a:t>freeradius</a:t>
             </a:r>
             <a:r>
-              <a:rPr lang="en-US" dirty="0" smtClean="0"/>
-              <a:t>/modules/</a:t>
-            </a:r>
-            <a:r>
-              <a:rPr lang="en-US" dirty="0" err="1" smtClean="0"/>
+              <a:rPr lang="en-US" dirty="0"/>
+              <a:t>/3.0/mods-available/</a:t>
+            </a:r>
+            <a:r>
+              <a:rPr lang="en-US" dirty="0" err="1"/>
               <a:t>ldap</a:t>
             </a:r>
             <a:endParaRPr lang="en-US" dirty="0" smtClean="0"/>
@@ -3284,7 +3292,7 @@
       </p:sp>
       <p:pic>
         <p:nvPicPr>
-          <p:cNvPr id="4" name="Picture 3"/>
+          <p:cNvPr id="5" name="Picture 4"/>
           <p:cNvPicPr>
             <a:picLocks noChangeAspect="1"/>
           </p:cNvPicPr>
@@ -3298,8 +3306,8 @@
         </p:blipFill>
         <p:spPr>
           <a:xfrm>
-            <a:off x="838200" y="3582194"/>
-            <a:ext cx="8009586" cy="2239057"/>
+            <a:off x="992679" y="3433293"/>
+            <a:ext cx="8421777" cy="3332264"/>
           </a:xfrm>
           <a:prstGeom prst="rect">
             <a:avLst/>
@@ -3387,52 +3395,6 @@
           </a:prstGeom>
         </p:spPr>
       </p:pic>
-      <p:sp>
-        <p:nvSpPr>
-          <p:cNvPr id="6" name="TextBox 5"/>
-          <p:cNvSpPr txBox="1"/>
-          <p:nvPr/>
-        </p:nvSpPr>
-        <p:spPr>
-          <a:xfrm>
-            <a:off x="1080655" y="2105891"/>
-            <a:ext cx="7972824" cy="369332"/>
-          </a:xfrm>
-          <a:prstGeom prst="rect">
-            <a:avLst/>
-          </a:prstGeom>
-          <a:noFill/>
-        </p:spPr>
-        <p:txBody>
-          <a:bodyPr wrap="none" rtlCol="0">
-            <a:spAutoFit/>
-          </a:bodyPr>
-          <a:lstStyle/>
-          <a:p>
-            <a:r>
-              <a:rPr lang="en-US" dirty="0" smtClean="0"/>
-              <a:t>vi /</a:t>
-            </a:r>
-            <a:r>
-              <a:rPr lang="en-US" dirty="0" err="1" smtClean="0"/>
-              <a:t>etc</a:t>
-            </a:r>
-            <a:r>
-              <a:rPr lang="en-US" dirty="0" smtClean="0"/>
-              <a:t>/</a:t>
-            </a:r>
-            <a:r>
-              <a:rPr lang="en-US" dirty="0" err="1" smtClean="0"/>
-              <a:t>freeradius</a:t>
-            </a:r>
-            <a:r>
-              <a:rPr lang="en-US" dirty="0" smtClean="0"/>
-              <a:t>/sites-available/default and uncomment the lines as shown below</a:t>
-            </a:r>
-            <a:endParaRPr lang="en-US" dirty="0"/>
-          </a:p>
-        </p:txBody>
-      </p:sp>
       <p:pic>
         <p:nvPicPr>
           <p:cNvPr id="8" name="Picture 7"/>
@@ -3451,6 +3413,30 @@
           <a:xfrm>
             <a:off x="947603" y="3860159"/>
             <a:ext cx="7545233" cy="2166568"/>
+          </a:xfrm>
+          <a:prstGeom prst="rect">
+            <a:avLst/>
+          </a:prstGeom>
+        </p:spPr>
+      </p:pic>
+      <p:pic>
+        <p:nvPicPr>
+          <p:cNvPr id="3" name="Picture 2"/>
+          <p:cNvPicPr>
+            <a:picLocks noChangeAspect="1"/>
+          </p:cNvPicPr>
+          <p:nvPr/>
+        </p:nvPicPr>
+        <p:blipFill>
+          <a:blip r:embed="rId4"/>
+          <a:stretch>
+            <a:fillRect/>
+          </a:stretch>
+        </p:blipFill>
+        <p:spPr>
+          <a:xfrm>
+            <a:off x="947603" y="1900177"/>
+            <a:ext cx="9188070" cy="313230"/>
           </a:xfrm>
           <a:prstGeom prst="rect">
             <a:avLst/>
@@ -3514,15 +3500,181 @@
           </a:p>
         </p:txBody>
       </p:sp>
+      <p:sp>
+        <p:nvSpPr>
+          <p:cNvPr id="5" name="TextBox 4"/>
+          <p:cNvSpPr txBox="1"/>
+          <p:nvPr/>
+        </p:nvSpPr>
+        <p:spPr>
+          <a:xfrm>
+            <a:off x="639364" y="1925782"/>
+            <a:ext cx="3752332" cy="369332"/>
+          </a:xfrm>
+          <a:prstGeom prst="rect">
+            <a:avLst/>
+          </a:prstGeom>
+          <a:noFill/>
+        </p:spPr>
+        <p:txBody>
+          <a:bodyPr wrap="square" rtlCol="0">
+            <a:spAutoFit/>
+          </a:bodyPr>
+          <a:lstStyle/>
+          <a:p>
+            <a:r>
+              <a:rPr lang="en-US" b="1" dirty="0" smtClean="0"/>
+              <a:t>vi</a:t>
+            </a:r>
+            <a:r>
+              <a:rPr lang="en-US" dirty="0" smtClean="0"/>
+              <a:t> /</a:t>
+            </a:r>
+            <a:r>
+              <a:rPr lang="en-US" b="1" dirty="0" err="1" smtClean="0"/>
+              <a:t>etc</a:t>
+            </a:r>
+            <a:r>
+              <a:rPr lang="en-US" b="1" dirty="0" smtClean="0"/>
+              <a:t>/</a:t>
+            </a:r>
+            <a:r>
+              <a:rPr lang="en-US" b="1" dirty="0" err="1" smtClean="0"/>
+              <a:t>freeradius</a:t>
+            </a:r>
+            <a:r>
+              <a:rPr lang="en-US" b="1" dirty="0" smtClean="0"/>
+              <a:t>/3.0/users</a:t>
+            </a:r>
+            <a:endParaRPr lang="en-US" b="1" dirty="0"/>
+          </a:p>
+        </p:txBody>
+      </p:sp>
+      <p:sp>
+        <p:nvSpPr>
+          <p:cNvPr id="6" name="TextBox 5"/>
+          <p:cNvSpPr txBox="1"/>
+          <p:nvPr/>
+        </p:nvSpPr>
+        <p:spPr>
+          <a:xfrm>
+            <a:off x="691938" y="3778783"/>
+            <a:ext cx="8582542" cy="1754326"/>
+          </a:xfrm>
+          <a:prstGeom prst="rect">
+            <a:avLst/>
+          </a:prstGeom>
+          <a:noFill/>
+        </p:spPr>
+        <p:txBody>
+          <a:bodyPr wrap="none" rtlCol="0">
+            <a:spAutoFit/>
+          </a:bodyPr>
+          <a:lstStyle/>
+          <a:p>
+            <a:r>
+              <a:rPr lang="en-US" b="1" dirty="0" smtClean="0"/>
+              <a:t>The above is to enabled LDAP Authentication for users.</a:t>
+            </a:r>
+          </a:p>
+          <a:p>
+            <a:endParaRPr lang="en-US" b="1" dirty="0"/>
+          </a:p>
+          <a:p>
+            <a:endParaRPr lang="en-US" b="1" dirty="0" smtClean="0"/>
+          </a:p>
+          <a:p>
+            <a:r>
+              <a:rPr lang="en-US" b="1" dirty="0" smtClean="0"/>
+              <a:t>Also copy </a:t>
+            </a:r>
+            <a:r>
+              <a:rPr lang="en-US" b="1" dirty="0" err="1" smtClean="0"/>
+              <a:t>ldap</a:t>
+            </a:r>
+            <a:r>
+              <a:rPr lang="en-US" b="1" dirty="0" smtClean="0"/>
+              <a:t> file from mod-available directory to the mod-enabled directory</a:t>
+            </a:r>
+            <a:r>
+              <a:rPr lang="en-US" b="1" dirty="0"/>
+              <a:t> </a:t>
+            </a:r>
+            <a:r>
+              <a:rPr lang="en-US" b="1" dirty="0" smtClean="0"/>
+              <a:t>as below.</a:t>
+            </a:r>
+          </a:p>
+          <a:p>
+            <a:endParaRPr lang="en-US" b="1" dirty="0"/>
+          </a:p>
+          <a:p>
+            <a:r>
+              <a:rPr lang="en-US" b="1" dirty="0" err="1"/>
+              <a:t>sudo</a:t>
+            </a:r>
+            <a:r>
+              <a:rPr lang="en-US" b="1" dirty="0"/>
+              <a:t> </a:t>
+            </a:r>
+            <a:r>
+              <a:rPr lang="en-US" b="1" dirty="0" err="1"/>
+              <a:t>cp</a:t>
+            </a:r>
+            <a:r>
+              <a:rPr lang="en-US" b="1" dirty="0"/>
+              <a:t> /</a:t>
+            </a:r>
+            <a:r>
+              <a:rPr lang="en-US" b="1" dirty="0" err="1"/>
+              <a:t>etc</a:t>
+            </a:r>
+            <a:r>
+              <a:rPr lang="en-US" b="1" dirty="0"/>
+              <a:t>/</a:t>
+            </a:r>
+            <a:r>
+              <a:rPr lang="en-US" b="1" dirty="0" err="1"/>
+              <a:t>freeradius</a:t>
+            </a:r>
+            <a:r>
+              <a:rPr lang="en-US" b="1" dirty="0"/>
+              <a:t>/3.0/mods-available/</a:t>
+            </a:r>
+            <a:r>
+              <a:rPr lang="en-US" b="1" dirty="0" err="1"/>
+              <a:t>ldap</a:t>
+            </a:r>
+            <a:r>
+              <a:rPr lang="en-US" b="1" dirty="0"/>
+              <a:t> /</a:t>
+            </a:r>
+            <a:r>
+              <a:rPr lang="en-US" b="1" dirty="0" err="1"/>
+              <a:t>etc</a:t>
+            </a:r>
+            <a:r>
+              <a:rPr lang="en-US" b="1" dirty="0"/>
+              <a:t>/</a:t>
+            </a:r>
+            <a:r>
+              <a:rPr lang="en-US" b="1" dirty="0" err="1"/>
+              <a:t>freeradius</a:t>
+            </a:r>
+            <a:r>
+              <a:rPr lang="en-US" b="1" dirty="0"/>
+              <a:t>/3.0/mods-enabled/</a:t>
+            </a:r>
+          </a:p>
+        </p:txBody>
+      </p:sp>
       <p:pic>
         <p:nvPicPr>
-          <p:cNvPr id="4" name="Content Placeholder 3"/>
+          <p:cNvPr id="7" name="Picture 6"/>
           <p:cNvPicPr>
-            <a:picLocks noGrp="1" noChangeAspect="1"/>
+            <a:picLocks noChangeAspect="1"/>
           </p:cNvPicPr>
-          <p:nvPr>
-            <p:ph idx="1"/>
-          </p:nvPr>
+          <p:nvPr/>
         </p:nvPicPr>
         <p:blipFill>
           <a:blip r:embed="rId2"/>
@@ -3532,94 +3684,14 @@
         </p:blipFill>
         <p:spPr>
           <a:xfrm>
-            <a:off x="639364" y="2549238"/>
-            <a:ext cx="10913272" cy="1440872"/>
+            <a:off x="940158" y="2691734"/>
+            <a:ext cx="8461420" cy="690429"/>
           </a:xfrm>
           <a:prstGeom prst="rect">
             <a:avLst/>
           </a:prstGeom>
         </p:spPr>
       </p:pic>
-      <p:sp>
-        <p:nvSpPr>
-          <p:cNvPr id="5" name="TextBox 4"/>
-          <p:cNvSpPr txBox="1"/>
-          <p:nvPr/>
-        </p:nvSpPr>
-        <p:spPr>
-          <a:xfrm>
-            <a:off x="639364" y="1925782"/>
-            <a:ext cx="2588529" cy="369332"/>
-          </a:xfrm>
-          <a:prstGeom prst="rect">
-            <a:avLst/>
-          </a:prstGeom>
-          <a:noFill/>
-        </p:spPr>
-        <p:txBody>
-          <a:bodyPr wrap="square" rtlCol="0">
-            <a:spAutoFit/>
-          </a:bodyPr>
-          <a:lstStyle/>
-          <a:p>
-            <a:r>
-              <a:rPr lang="en-US" b="1" dirty="0" smtClean="0"/>
-              <a:t>vi</a:t>
-            </a:r>
-            <a:r>
-              <a:rPr lang="en-US" dirty="0" smtClean="0"/>
-              <a:t> /</a:t>
-            </a:r>
-            <a:r>
-              <a:rPr lang="en-US" b="1" dirty="0" err="1" smtClean="0"/>
-              <a:t>etc</a:t>
-            </a:r>
-            <a:r>
-              <a:rPr lang="en-US" b="1" dirty="0" smtClean="0"/>
-              <a:t>/</a:t>
-            </a:r>
-            <a:r>
-              <a:rPr lang="en-US" b="1" dirty="0" err="1" smtClean="0"/>
-              <a:t>freeradius</a:t>
-            </a:r>
-            <a:r>
-              <a:rPr lang="en-US" b="1" dirty="0" smtClean="0"/>
-              <a:t>/users</a:t>
-            </a:r>
-            <a:endParaRPr lang="en-US" b="1" dirty="0"/>
-          </a:p>
-        </p:txBody>
-      </p:sp>
-      <p:sp>
-        <p:nvSpPr>
-          <p:cNvPr id="6" name="TextBox 5"/>
-          <p:cNvSpPr txBox="1"/>
-          <p:nvPr/>
-        </p:nvSpPr>
-        <p:spPr>
-          <a:xfrm>
-            <a:off x="838200" y="4987636"/>
-            <a:ext cx="9858340" cy="369332"/>
-          </a:xfrm>
-          <a:prstGeom prst="rect">
-            <a:avLst/>
-          </a:prstGeom>
-          <a:noFill/>
-        </p:spPr>
-        <p:txBody>
-          <a:bodyPr wrap="none" rtlCol="0">
-            <a:spAutoFit/>
-          </a:bodyPr>
-          <a:lstStyle/>
-          <a:p>
-            <a:r>
-              <a:rPr lang="en-US" b="1" dirty="0" smtClean="0"/>
-              <a:t>The above is to set the DEFAULT LDAP-GROUP to the users group containing our “Test User1” Account</a:t>
-            </a:r>
-            <a:endParaRPr lang="en-US" b="1" dirty="0"/>
-          </a:p>
-        </p:txBody>
-      </p:sp>
     </p:spTree>
     <p:extLst>
       <p:ext uri="{BB962C8B-B14F-4D97-AF65-F5344CB8AC3E}">
@@ -3710,7 +3782,7 @@
             </a:r>
             <a:r>
               <a:rPr lang="en-US" dirty="0" smtClean="0"/>
-              <a:t>/sites-available/inner-tunnel</a:t>
+              <a:t>/3.0/sites-available/inner-tunnel</a:t>
             </a:r>
           </a:p>
           <a:p>
@@ -3778,7 +3850,7 @@
         <p:spPr>
           <a:xfrm>
             <a:off x="947603" y="6311900"/>
-            <a:ext cx="8836843" cy="369332"/>
+            <a:ext cx="9316589" cy="369332"/>
           </a:xfrm>
           <a:prstGeom prst="rect">
             <a:avLst/>
@@ -3792,16 +3864,36 @@
           <a:lstStyle/>
           <a:p>
             <a:r>
+              <a:rPr lang="en-US" b="1" dirty="0" err="1"/>
+              <a:t>sudo</a:t>
+            </a:r>
+            <a:r>
+              <a:rPr lang="en-US" b="1" dirty="0"/>
+              <a:t> </a:t>
+            </a:r>
+            <a:r>
+              <a:rPr lang="en-US" b="1" dirty="0" err="1"/>
+              <a:t>systemctl</a:t>
+            </a:r>
+            <a:r>
+              <a:rPr lang="en-US" b="1" dirty="0"/>
+              <a:t> </a:t>
+            </a:r>
+            <a:r>
               <a:rPr lang="en-US" b="1" dirty="0" smtClean="0"/>
-              <a:t>service </a:t>
-            </a:r>
-            <a:r>
-              <a:rPr lang="en-US" b="1" dirty="0" err="1" smtClean="0"/>
+              <a:t>restart </a:t>
+            </a:r>
+            <a:r>
+              <a:rPr lang="en-US" b="1" dirty="0" err="1"/>
               <a:t>freeradius</a:t>
             </a:r>
             <a:r>
+              <a:rPr lang="en-US" b="1" dirty="0"/>
+              <a:t>                                                      </a:t>
+            </a:r>
+            <a:r>
               <a:rPr lang="en-US" b="1" dirty="0" smtClean="0"/>
-              <a:t> restart                                                           // Restart the </a:t>
+              <a:t>// Restart the </a:t>
             </a:r>
             <a:r>
               <a:rPr lang="en-US" b="1" dirty="0" err="1" smtClean="0"/>
@@ -3892,22 +3984,82 @@
           <a:lstStyle/>
           <a:p>
             <a:r>
+              <a:rPr lang="en-US" dirty="0"/>
+              <a:t> </a:t>
+            </a:r>
+            <a:r>
+              <a:rPr lang="en-US" dirty="0" err="1" smtClean="0"/>
+              <a:t>sudo</a:t>
+            </a:r>
+            <a:r>
+              <a:rPr lang="en-US" dirty="0" smtClean="0"/>
+              <a:t> </a:t>
+            </a:r>
+            <a:r>
               <a:rPr lang="en-US" dirty="0" err="1" smtClean="0"/>
               <a:t>radtest</a:t>
             </a:r>
             <a:r>
               <a:rPr lang="en-US" dirty="0" smtClean="0"/>
-              <a:t> tuser1 test1 127.0.0.1 0 testing123</a:t>
+              <a:t> frank afnog123 127.0.0.1 0 testing123</a:t>
             </a:r>
           </a:p>
           <a:p>
             <a:endParaRPr lang="en-US" dirty="0"/>
+          </a:p>
+        </p:txBody>
+      </p:sp>
+      <p:sp>
+        <p:nvSpPr>
+          <p:cNvPr id="6" name="TextBox 5"/>
+          <p:cNvSpPr txBox="1"/>
+          <p:nvPr/>
+        </p:nvSpPr>
+        <p:spPr>
+          <a:xfrm>
+            <a:off x="969288" y="4976634"/>
+            <a:ext cx="11083675" cy="1200329"/>
+          </a:xfrm>
+          <a:prstGeom prst="rect">
+            <a:avLst/>
+          </a:prstGeom>
+          <a:noFill/>
+        </p:spPr>
+        <p:txBody>
+          <a:bodyPr wrap="none" rtlCol="0">
+            <a:spAutoFit/>
+          </a:bodyPr>
+          <a:lstStyle/>
+          <a:p>
+            <a:r>
+              <a:rPr lang="en-US" b="1" dirty="0" smtClean="0"/>
+              <a:t>Where Username = frank</a:t>
+            </a:r>
+          </a:p>
+          <a:p>
+            <a:r>
+              <a:rPr lang="en-US" b="1" dirty="0" smtClean="0"/>
+              <a:t>Password = afnog123</a:t>
+            </a:r>
+          </a:p>
+          <a:p>
+            <a:r>
+              <a:rPr lang="en-US" b="1" dirty="0" smtClean="0"/>
+              <a:t>Radius Secret = testing123  </a:t>
+            </a:r>
+          </a:p>
+          <a:p>
+            <a:r>
+              <a:rPr lang="en-US" b="1" dirty="0" smtClean="0"/>
+              <a:t>Also Note that we have a successful authentication  as shown in diagram above with radius packet in yellow colors</a:t>
+            </a:r>
+            <a:endParaRPr lang="en-US" b="1" dirty="0"/>
           </a:p>
         </p:txBody>
       </p:sp>
       <p:pic>
         <p:nvPicPr>
-          <p:cNvPr id="5" name="Picture 4"/>
+          <p:cNvPr id="4" name="Picture 3"/>
           <p:cNvPicPr>
             <a:picLocks noChangeAspect="1"/>
           </p:cNvPicPr>
@@ -3921,70 +4073,14 @@
         </p:blipFill>
         <p:spPr>
           <a:xfrm>
-            <a:off x="1059440" y="2408017"/>
-            <a:ext cx="10813905" cy="2828997"/>
+            <a:off x="1059440" y="2598598"/>
+            <a:ext cx="8158162" cy="1982608"/>
           </a:xfrm>
           <a:prstGeom prst="rect">
             <a:avLst/>
           </a:prstGeom>
         </p:spPr>
       </p:pic>
-      <p:sp>
-        <p:nvSpPr>
-          <p:cNvPr id="6" name="TextBox 5"/>
-          <p:cNvSpPr txBox="1"/>
-          <p:nvPr/>
-        </p:nvSpPr>
-        <p:spPr>
-          <a:xfrm>
-            <a:off x="1059440" y="5354178"/>
-            <a:ext cx="11083675" cy="1200329"/>
-          </a:xfrm>
-          <a:prstGeom prst="rect">
-            <a:avLst/>
-          </a:prstGeom>
-          <a:noFill/>
-        </p:spPr>
-        <p:txBody>
-          <a:bodyPr wrap="none" rtlCol="0">
-            <a:spAutoFit/>
-          </a:bodyPr>
-          <a:lstStyle/>
-          <a:p>
-            <a:r>
-              <a:rPr lang="en-US" b="1" dirty="0" smtClean="0"/>
-              <a:t>Where Username = tuser1</a:t>
-            </a:r>
-          </a:p>
-          <a:p>
-            <a:r>
-              <a:rPr lang="en-US" b="1" dirty="0" smtClean="0"/>
-              <a:t>Password = test1</a:t>
-            </a:r>
-          </a:p>
-          <a:p>
-            <a:r>
-              <a:rPr lang="en-US" b="1" dirty="0" smtClean="0"/>
-              <a:t>Radius Secret = testing123  </a:t>
-            </a:r>
-          </a:p>
-          <a:p>
-            <a:r>
-              <a:rPr lang="en-US" b="1" dirty="0" smtClean="0"/>
-              <a:t>Also Note that we have a successful authentication  as shown in diagram above </a:t>
-            </a:r>
-            <a:r>
-              <a:rPr lang="en-US" b="1" dirty="0" smtClean="0"/>
-              <a:t>with radius packet in </a:t>
-            </a:r>
-            <a:r>
-              <a:rPr lang="en-US" b="1" dirty="0" smtClean="0"/>
-              <a:t>yellow colors</a:t>
-            </a:r>
-            <a:endParaRPr lang="en-US" b="1" dirty="0"/>
-          </a:p>
-        </p:txBody>
-      </p:sp>
     </p:spTree>
     <p:extLst>
       <p:ext uri="{BB962C8B-B14F-4D97-AF65-F5344CB8AC3E}">
@@ -4113,7 +4209,7 @@
         <p:spPr>
           <a:xfrm>
             <a:off x="955963" y="2114173"/>
-            <a:ext cx="3075710" cy="369332"/>
+            <a:ext cx="4079676" cy="369332"/>
           </a:xfrm>
           <a:prstGeom prst="rect">
             <a:avLst/>
@@ -4144,7 +4240,7 @@
             </a:r>
             <a:r>
               <a:rPr lang="en-US" dirty="0" smtClean="0"/>
-              <a:t>/</a:t>
+              <a:t>/3.0/</a:t>
             </a:r>
             <a:r>
               <a:rPr lang="en-US" dirty="0" err="1" smtClean="0"/>
@@ -4163,7 +4259,7 @@
         <p:spPr>
           <a:xfrm>
             <a:off x="955963" y="5184815"/>
-            <a:ext cx="10238700" cy="369332"/>
+            <a:ext cx="10972812" cy="369332"/>
           </a:xfrm>
           <a:prstGeom prst="rect">
             <a:avLst/>
@@ -4177,16 +4273,32 @@
           <a:lstStyle/>
           <a:p>
             <a:r>
+              <a:rPr lang="en-US" b="1" dirty="0" err="1"/>
+              <a:t>sudo</a:t>
+            </a:r>
+            <a:r>
+              <a:rPr lang="en-US" b="1" dirty="0"/>
+              <a:t> </a:t>
+            </a:r>
+            <a:r>
+              <a:rPr lang="en-US" b="1" dirty="0" err="1"/>
+              <a:t>systemctl</a:t>
+            </a:r>
+            <a:r>
+              <a:rPr lang="en-US" b="1" dirty="0"/>
+              <a:t> restart </a:t>
+            </a:r>
+            <a:r>
+              <a:rPr lang="en-US" b="1" dirty="0" err="1"/>
+              <a:t>freeradius</a:t>
+            </a:r>
+            <a:r>
               <a:rPr lang="en-US" dirty="0" smtClean="0"/>
-              <a:t>service </a:t>
-            </a:r>
-            <a:r>
-              <a:rPr lang="en-US" dirty="0" err="1" smtClean="0"/>
-              <a:t>freeradius</a:t>
+              <a:t>                          </a:t>
             </a:r>
             <a:r>
               <a:rPr lang="en-US" dirty="0" smtClean="0"/>
-              <a:t> restart                           //N.B: Restart Radius anytime there are changes done to the </a:t>
+              <a:t>//N.B: Restart Radius anytime there are changes done to the </a:t>
             </a:r>
             <a:r>
               <a:rPr lang="en-US" dirty="0" err="1" smtClean="0"/>
@@ -4257,15 +4369,76 @@
           </a:p>
         </p:txBody>
       </p:sp>
+      <p:sp>
+        <p:nvSpPr>
+          <p:cNvPr id="5" name="TextBox 4"/>
+          <p:cNvSpPr txBox="1"/>
+          <p:nvPr/>
+        </p:nvSpPr>
+        <p:spPr>
+          <a:xfrm>
+            <a:off x="838200" y="5045591"/>
+            <a:ext cx="9291198" cy="923330"/>
+          </a:xfrm>
+          <a:prstGeom prst="rect">
+            <a:avLst/>
+          </a:prstGeom>
+          <a:noFill/>
+        </p:spPr>
+        <p:txBody>
+          <a:bodyPr wrap="none" rtlCol="0">
+            <a:spAutoFit/>
+          </a:bodyPr>
+          <a:lstStyle/>
+          <a:p>
+            <a:r>
+              <a:rPr lang="en-US" dirty="0" smtClean="0"/>
+              <a:t>Run the test as done earlier for the test account and this time round changing the secret to </a:t>
+            </a:r>
+            <a:r>
+              <a:rPr lang="en-US" dirty="0" err="1" smtClean="0"/>
+              <a:t>afnog</a:t>
+            </a:r>
+            <a:endParaRPr lang="en-US" dirty="0" smtClean="0"/>
+          </a:p>
+          <a:p>
+            <a:endParaRPr lang="en-US" dirty="0"/>
+          </a:p>
+          <a:p>
+            <a:r>
+              <a:rPr lang="en-US" dirty="0" smtClean="0"/>
+              <a:t>You should get an Access-Accept packet which shows Radius password has been changed.</a:t>
+            </a:r>
+            <a:endParaRPr lang="en-US" dirty="0"/>
+          </a:p>
+        </p:txBody>
+      </p:sp>
+      <p:sp>
+        <p:nvSpPr>
+          <p:cNvPr id="7" name="Content Placeholder 6"/>
+          <p:cNvSpPr>
+            <a:spLocks noGrp="1"/>
+          </p:cNvSpPr>
+          <p:nvPr>
+            <p:ph idx="1"/>
+          </p:nvPr>
+        </p:nvSpPr>
+        <p:spPr/>
+        <p:txBody>
+          <a:bodyPr/>
+          <a:lstStyle/>
+          <a:p>
+            <a:endParaRPr lang="en-US"/>
+          </a:p>
+        </p:txBody>
+      </p:sp>
       <p:pic>
         <p:nvPicPr>
-          <p:cNvPr id="4" name="Content Placeholder 3"/>
+          <p:cNvPr id="8" name="Picture 7"/>
           <p:cNvPicPr>
-            <a:picLocks noGrp="1" noChangeAspect="1"/>
+            <a:picLocks noChangeAspect="1"/>
           </p:cNvPicPr>
-          <p:nvPr>
-            <p:ph idx="1"/>
-          </p:nvPr>
+          <p:nvPr/>
         </p:nvPicPr>
         <p:blipFill>
           <a:blip r:embed="rId2"/>
@@ -4275,58 +4448,14 @@
         </p:blipFill>
         <p:spPr>
           <a:xfrm>
-            <a:off x="838200" y="2382982"/>
-            <a:ext cx="10256833" cy="2196739"/>
+            <a:off x="838200" y="1825624"/>
+            <a:ext cx="10271452" cy="2810769"/>
           </a:xfrm>
           <a:prstGeom prst="rect">
             <a:avLst/>
           </a:prstGeom>
         </p:spPr>
       </p:pic>
-      <p:sp>
-        <p:nvSpPr>
-          <p:cNvPr id="5" name="TextBox 4"/>
-          <p:cNvSpPr txBox="1"/>
-          <p:nvPr/>
-        </p:nvSpPr>
-        <p:spPr>
-          <a:xfrm>
-            <a:off x="838200" y="5444836"/>
-            <a:ext cx="9291198" cy="923330"/>
-          </a:xfrm>
-          <a:prstGeom prst="rect">
-            <a:avLst/>
-          </a:prstGeom>
-          <a:noFill/>
-        </p:spPr>
-        <p:txBody>
-          <a:bodyPr wrap="none" rtlCol="0">
-            <a:spAutoFit/>
-          </a:bodyPr>
-          <a:lstStyle/>
-          <a:p>
-            <a:r>
-              <a:rPr lang="en-US" dirty="0" smtClean="0"/>
-              <a:t>Run the test as done earlier for the test account and this time round changing the secret to </a:t>
-            </a:r>
-            <a:r>
-              <a:rPr lang="en-US" dirty="0" err="1" smtClean="0"/>
-              <a:t>afnog</a:t>
-            </a:r>
-            <a:endParaRPr lang="en-US" dirty="0" smtClean="0"/>
-          </a:p>
-          <a:p>
-            <a:endParaRPr lang="en-US" dirty="0"/>
-          </a:p>
-          <a:p>
-            <a:r>
-              <a:rPr lang="en-US" dirty="0" smtClean="0"/>
-              <a:t>You should get an Access-Accept packet which shows Radius password has been changed.</a:t>
-            </a:r>
-            <a:endParaRPr lang="en-US" dirty="0"/>
-          </a:p>
-        </p:txBody>
-      </p:sp>
     </p:spTree>
     <p:extLst>
       <p:ext uri="{BB962C8B-B14F-4D97-AF65-F5344CB8AC3E}">

</xml_diff>